<commit_message>
Update Using Eigenvalues and Eigenvectors.pptx
</commit_message>
<xml_diff>
--- a/docs/lectures/Using Eigenvalues and Eigenvectors.pptx
+++ b/docs/lectures/Using Eigenvalues and Eigenvectors.pptx
@@ -5,10 +5,10 @@
     <p:sldMasterId id="2147483648" r:id="rId1"/>
   </p:sldMasterIdLst>
   <p:notesMasterIdLst>
-    <p:notesMasterId r:id="rId22"/>
+    <p:notesMasterId r:id="rId23"/>
   </p:notesMasterIdLst>
   <p:handoutMasterIdLst>
-    <p:handoutMasterId r:id="rId23"/>
+    <p:handoutMasterId r:id="rId24"/>
   </p:handoutMasterIdLst>
   <p:sldIdLst>
     <p:sldId id="256" r:id="rId2"/>
@@ -24,13 +24,14 @@
     <p:sldId id="281" r:id="rId12"/>
     <p:sldId id="283" r:id="rId13"/>
     <p:sldId id="289" r:id="rId14"/>
-    <p:sldId id="284" r:id="rId15"/>
-    <p:sldId id="290" r:id="rId16"/>
-    <p:sldId id="285" r:id="rId17"/>
-    <p:sldId id="286" r:id="rId18"/>
-    <p:sldId id="287" r:id="rId19"/>
-    <p:sldId id="291" r:id="rId20"/>
-    <p:sldId id="274" r:id="rId21"/>
+    <p:sldId id="295" r:id="rId15"/>
+    <p:sldId id="284" r:id="rId16"/>
+    <p:sldId id="290" r:id="rId17"/>
+    <p:sldId id="285" r:id="rId18"/>
+    <p:sldId id="286" r:id="rId19"/>
+    <p:sldId id="287" r:id="rId20"/>
+    <p:sldId id="291" r:id="rId21"/>
+    <p:sldId id="274" r:id="rId22"/>
   </p:sldIdLst>
   <p:sldSz cx="12192000" cy="6858000"/>
   <p:notesSz cx="7099300" cy="10234613"/>
@@ -336,7 +337,7 @@
           <a:p>
             <a:fld id="{6AD24EC9-7198-4B56-AEF9-BBEDF5640E20}" type="datetimeFigureOut">
               <a:rPr lang="en-GB" smtClean="0"/>
-              <a:t>25/10/2022</a:t>
+              <a:t>24/10/2023</a:t>
             </a:fld>
             <a:endParaRPr lang="en-GB"/>
           </a:p>
@@ -501,7 +502,7 @@
           <a:p>
             <a:fld id="{9DA14B43-C65A-4AE6-9D2C-F5DDC46BD098}" type="datetimeFigureOut">
               <a:rPr lang="en-GB" smtClean="0"/>
-              <a:t>25/10/2022</a:t>
+              <a:t>24/10/2023</a:t>
             </a:fld>
             <a:endParaRPr lang="en-GB"/>
           </a:p>
@@ -1349,7 +1350,7 @@
           <a:p>
             <a:fld id="{EADA9985-F9B8-4E11-8A40-B153142C5EE0}" type="datetimeFigureOut">
               <a:rPr lang="en-GB" smtClean="0"/>
-              <a:t>25/10/2022</a:t>
+              <a:t>24/10/2023</a:t>
             </a:fld>
             <a:endParaRPr lang="en-GB"/>
           </a:p>
@@ -1594,7 +1595,7 @@
           <a:p>
             <a:fld id="{EADA9985-F9B8-4E11-8A40-B153142C5EE0}" type="datetimeFigureOut">
               <a:rPr lang="en-GB" smtClean="0"/>
-              <a:t>25/10/2022</a:t>
+              <a:t>24/10/2023</a:t>
             </a:fld>
             <a:endParaRPr lang="en-GB"/>
           </a:p>
@@ -1774,7 +1775,7 @@
           <a:p>
             <a:fld id="{EADA9985-F9B8-4E11-8A40-B153142C5EE0}" type="datetimeFigureOut">
               <a:rPr lang="en-GB" smtClean="0"/>
-              <a:t>25/10/2022</a:t>
+              <a:t>24/10/2023</a:t>
             </a:fld>
             <a:endParaRPr lang="en-GB"/>
           </a:p>
@@ -1944,7 +1945,7 @@
           <a:p>
             <a:fld id="{EADA9985-F9B8-4E11-8A40-B153142C5EE0}" type="datetimeFigureOut">
               <a:rPr lang="en-GB" smtClean="0"/>
-              <a:t>25/10/2022</a:t>
+              <a:t>24/10/2023</a:t>
             </a:fld>
             <a:endParaRPr lang="en-GB"/>
           </a:p>
@@ -2226,7 +2227,7 @@
           <a:p>
             <a:fld id="{EADA9985-F9B8-4E11-8A40-B153142C5EE0}" type="datetimeFigureOut">
               <a:rPr lang="en-GB" smtClean="0"/>
-              <a:t>25/10/2022</a:t>
+              <a:t>24/10/2023</a:t>
             </a:fld>
             <a:endParaRPr lang="en-GB"/>
           </a:p>
@@ -2458,7 +2459,7 @@
           <a:p>
             <a:fld id="{EADA9985-F9B8-4E11-8A40-B153142C5EE0}" type="datetimeFigureOut">
               <a:rPr lang="en-GB" smtClean="0"/>
-              <a:t>25/10/2022</a:t>
+              <a:t>24/10/2023</a:t>
             </a:fld>
             <a:endParaRPr lang="en-GB"/>
           </a:p>
@@ -2825,7 +2826,7 @@
           <a:p>
             <a:fld id="{EADA9985-F9B8-4E11-8A40-B153142C5EE0}" type="datetimeFigureOut">
               <a:rPr lang="en-GB" smtClean="0"/>
-              <a:t>25/10/2022</a:t>
+              <a:t>24/10/2023</a:t>
             </a:fld>
             <a:endParaRPr lang="en-GB"/>
           </a:p>
@@ -2943,7 +2944,7 @@
           <a:p>
             <a:fld id="{EADA9985-F9B8-4E11-8A40-B153142C5EE0}" type="datetimeFigureOut">
               <a:rPr lang="en-GB" smtClean="0"/>
-              <a:t>25/10/2022</a:t>
+              <a:t>24/10/2023</a:t>
             </a:fld>
             <a:endParaRPr lang="en-GB"/>
           </a:p>
@@ -3038,7 +3039,7 @@
           <a:p>
             <a:fld id="{EADA9985-F9B8-4E11-8A40-B153142C5EE0}" type="datetimeFigureOut">
               <a:rPr lang="en-GB" smtClean="0"/>
-              <a:t>25/10/2022</a:t>
+              <a:t>24/10/2023</a:t>
             </a:fld>
             <a:endParaRPr lang="en-GB"/>
           </a:p>
@@ -3315,7 +3316,7 @@
           <a:p>
             <a:fld id="{EADA9985-F9B8-4E11-8A40-B153142C5EE0}" type="datetimeFigureOut">
               <a:rPr lang="en-GB" smtClean="0"/>
-              <a:t>25/10/2022</a:t>
+              <a:t>24/10/2023</a:t>
             </a:fld>
             <a:endParaRPr lang="en-GB"/>
           </a:p>
@@ -3568,7 +3569,7 @@
           <a:p>
             <a:fld id="{EADA9985-F9B8-4E11-8A40-B153142C5EE0}" type="datetimeFigureOut">
               <a:rPr lang="en-GB" smtClean="0"/>
-              <a:t>25/10/2022</a:t>
+              <a:t>24/10/2023</a:t>
             </a:fld>
             <a:endParaRPr lang="en-GB"/>
           </a:p>
@@ -3781,7 +3782,7 @@
           <a:p>
             <a:fld id="{EADA9985-F9B8-4E11-8A40-B153142C5EE0}" type="datetimeFigureOut">
               <a:rPr lang="en-GB" smtClean="0"/>
-              <a:t>25/10/2022</a:t>
+              <a:t>24/10/2023</a:t>
             </a:fld>
             <a:endParaRPr lang="en-GB"/>
           </a:p>
@@ -4352,18 +4353,20 @@
         </p:nvSpPr>
         <p:spPr/>
         <p:txBody>
-          <a:bodyPr/>
+          <a:bodyPr>
+            <a:normAutofit/>
+          </a:bodyPr>
           <a:lstStyle/>
           <a:p>
             <a:r>
-              <a:rPr lang="en-US" dirty="0"/>
+              <a:rPr lang="en-US" sz="4000" dirty="0"/>
               <a:t>Modal motion in free vibration – Eigenvalues</a:t>
             </a:r>
           </a:p>
         </p:txBody>
       </p:sp>
-      <mc:AlternateContent xmlns:mc="http://schemas.openxmlformats.org/markup-compatibility/2006">
-        <mc:Choice xmlns:a14="http://schemas.microsoft.com/office/drawing/2010/main" Requires="a14">
+      <mc:AlternateContent xmlns:mc="http://schemas.openxmlformats.org/markup-compatibility/2006" xmlns:a14="http://schemas.microsoft.com/office/drawing/2010/main">
+        <mc:Choice Requires="a14">
           <p:sp>
             <p:nvSpPr>
               <p:cNvPr id="3" name="Content Placeholder 2">
@@ -5657,7 +5660,7 @@
             </p:txBody>
           </p:sp>
         </mc:Choice>
-        <mc:Fallback>
+        <mc:Fallback xmlns="">
           <p:sp>
             <p:nvSpPr>
               <p:cNvPr id="3" name="Content Placeholder 2">
@@ -5797,11 +5800,13 @@
         </p:nvSpPr>
         <p:spPr/>
         <p:txBody>
-          <a:bodyPr/>
+          <a:bodyPr>
+            <a:normAutofit/>
+          </a:bodyPr>
           <a:lstStyle/>
           <a:p>
             <a:r>
-              <a:rPr lang="en-US" dirty="0"/>
+              <a:rPr lang="en-US" sz="4000" dirty="0"/>
               <a:t>Modal motion in free vibration - Eigenvalues</a:t>
             </a:r>
           </a:p>
@@ -6138,11 +6143,13 @@
         </p:nvSpPr>
         <p:spPr/>
         <p:txBody>
-          <a:bodyPr/>
+          <a:bodyPr>
+            <a:normAutofit/>
+          </a:bodyPr>
           <a:lstStyle/>
           <a:p>
             <a:r>
-              <a:rPr lang="en-US" dirty="0"/>
+              <a:rPr lang="en-US" sz="4000" dirty="0"/>
               <a:t>Modal motion in free vibration – Eigenvalues</a:t>
             </a:r>
           </a:p>
@@ -6304,7 +6311,15 @@
                 </a14:m>
                 <a:r>
                   <a:rPr lang="en-US" dirty="0"/>
-                  <a:t> is the modal damping factor and </a:t>
+                  <a:t> is the </a:t>
+                </a:r>
+                <a:r>
+                  <a:rPr lang="en-US" u="sng" dirty="0"/>
+                  <a:t>modal damping factor </a:t>
+                </a:r>
+                <a:r>
+                  <a:rPr lang="en-US" dirty="0"/>
+                  <a:t>and </a:t>
                 </a:r>
                 <a14:m>
                   <m:oMath xmlns:m="http://schemas.openxmlformats.org/officeDocument/2006/math">
@@ -6337,7 +6352,15 @@
                 </a14:m>
                 <a:r>
                   <a:rPr lang="en-US" dirty="0"/>
-                  <a:t> is the damped natural frequency.</a:t>
+                  <a:t> is the </a:t>
+                </a:r>
+                <a:r>
+                  <a:rPr lang="en-US" u="sng" dirty="0"/>
+                  <a:t>damped natural frequency</a:t>
+                </a:r>
+                <a:r>
+                  <a:rPr lang="en-US" dirty="0"/>
+                  <a:t>.</a:t>
                 </a:r>
               </a:p>
             </p:txBody>
@@ -6497,6 +6520,340 @@
 </file>
 
 <file path=ppt/slides/slide14.xml><?xml version="1.0" encoding="utf-8"?>
+<p:sld xmlns:a="http://schemas.openxmlformats.org/drawingml/2006/main" xmlns:r="http://schemas.openxmlformats.org/officeDocument/2006/relationships" xmlns:p="http://schemas.openxmlformats.org/presentationml/2006/main">
+  <p:cSld>
+    <p:spTree>
+      <p:nvGrpSpPr>
+        <p:cNvPr id="1" name=""/>
+        <p:cNvGrpSpPr/>
+        <p:nvPr/>
+      </p:nvGrpSpPr>
+      <p:grpSpPr>
+        <a:xfrm>
+          <a:off x="0" y="0"/>
+          <a:ext cx="0" cy="0"/>
+          <a:chOff x="0" y="0"/>
+          <a:chExt cx="0" cy="0"/>
+        </a:xfrm>
+      </p:grpSpPr>
+      <p:sp>
+        <p:nvSpPr>
+          <p:cNvPr id="2" name="Title 1">
+            <a:extLst>
+              <a:ext uri="{FF2B5EF4-FFF2-40B4-BE49-F238E27FC236}">
+                <a16:creationId xmlns:a16="http://schemas.microsoft.com/office/drawing/2014/main" id="{1B5FE6EF-8885-519D-BC16-7E02E861361E}"/>
+              </a:ext>
+            </a:extLst>
+          </p:cNvPr>
+          <p:cNvSpPr>
+            <a:spLocks noGrp="1"/>
+          </p:cNvSpPr>
+          <p:nvPr>
+            <p:ph type="title"/>
+          </p:nvPr>
+        </p:nvSpPr>
+        <p:spPr/>
+        <p:txBody>
+          <a:bodyPr/>
+          <a:lstStyle/>
+          <a:p>
+            <a:r>
+              <a:rPr lang="en-GB" dirty="0"/>
+              <a:t>Check for yourself</a:t>
+            </a:r>
+          </a:p>
+        </p:txBody>
+      </p:sp>
+      <p:pic>
+        <p:nvPicPr>
+          <p:cNvPr id="6" name="Picture 5" descr="Diagram&#10;&#10;Description automatically generated">
+            <a:extLst>
+              <a:ext uri="{FF2B5EF4-FFF2-40B4-BE49-F238E27FC236}">
+                <a16:creationId xmlns:a16="http://schemas.microsoft.com/office/drawing/2014/main" id="{823BA7A5-3DC9-341B-A954-B1B1100565DB}"/>
+              </a:ext>
+            </a:extLst>
+          </p:cNvPr>
+          <p:cNvPicPr>
+            <a:picLocks noChangeAspect="1"/>
+          </p:cNvPicPr>
+          <p:nvPr/>
+        </p:nvPicPr>
+        <p:blipFill rotWithShape="1">
+          <a:blip r:embed="rId2">
+            <a:extLst>
+              <a:ext uri="{28A0092B-C50C-407E-A947-70E740481C1C}">
+                <a14:useLocalDpi xmlns:a14="http://schemas.microsoft.com/office/drawing/2010/main" val="0"/>
+              </a:ext>
+            </a:extLst>
+          </a:blip>
+          <a:srcRect l="32515" t="9163" r="25748" b="32761"/>
+          <a:stretch/>
+        </p:blipFill>
+        <p:spPr>
+          <a:xfrm>
+            <a:off x="7741170" y="520947"/>
+            <a:ext cx="3612630" cy="3499423"/>
+          </a:xfrm>
+          <a:prstGeom prst="rect">
+            <a:avLst/>
+          </a:prstGeom>
+        </p:spPr>
+      </p:pic>
+      <p:pic>
+        <p:nvPicPr>
+          <p:cNvPr id="8" name="Picture 7" descr="A number of numbers and symbols&#10;&#10;Description automatically generated with medium confidence">
+            <a:extLst>
+              <a:ext uri="{FF2B5EF4-FFF2-40B4-BE49-F238E27FC236}">
+                <a16:creationId xmlns:a16="http://schemas.microsoft.com/office/drawing/2014/main" id="{A84E21D1-969F-3282-583A-B82032216DE1}"/>
+              </a:ext>
+            </a:extLst>
+          </p:cNvPr>
+          <p:cNvPicPr>
+            <a:picLocks noChangeAspect="1"/>
+          </p:cNvPicPr>
+          <p:nvPr/>
+        </p:nvPicPr>
+        <p:blipFill>
+          <a:blip r:embed="rId3">
+            <a:extLst>
+              <a:ext uri="{28A0092B-C50C-407E-A947-70E740481C1C}">
+                <a14:useLocalDpi xmlns:a14="http://schemas.microsoft.com/office/drawing/2010/main" val="0"/>
+              </a:ext>
+            </a:extLst>
+          </a:blip>
+          <a:stretch>
+            <a:fillRect/>
+          </a:stretch>
+        </p:blipFill>
+        <p:spPr>
+          <a:xfrm>
+            <a:off x="1343110" y="2164663"/>
+            <a:ext cx="5156200" cy="1663700"/>
+          </a:xfrm>
+          <a:prstGeom prst="rect">
+            <a:avLst/>
+          </a:prstGeom>
+        </p:spPr>
+      </p:pic>
+      <p:pic>
+        <p:nvPicPr>
+          <p:cNvPr id="10" name="Picture 9" descr="A number and numbers on a white background&#10;&#10;Description automatically generated">
+            <a:extLst>
+              <a:ext uri="{FF2B5EF4-FFF2-40B4-BE49-F238E27FC236}">
+                <a16:creationId xmlns:a16="http://schemas.microsoft.com/office/drawing/2014/main" id="{BF618201-333D-A881-D82B-36B84450E594}"/>
+              </a:ext>
+            </a:extLst>
+          </p:cNvPr>
+          <p:cNvPicPr>
+            <a:picLocks noChangeAspect="1"/>
+          </p:cNvPicPr>
+          <p:nvPr/>
+        </p:nvPicPr>
+        <p:blipFill>
+          <a:blip r:embed="rId4">
+            <a:extLst>
+              <a:ext uri="{28A0092B-C50C-407E-A947-70E740481C1C}">
+                <a14:useLocalDpi xmlns:a14="http://schemas.microsoft.com/office/drawing/2010/main" val="0"/>
+              </a:ext>
+            </a:extLst>
+          </a:blip>
+          <a:stretch>
+            <a:fillRect/>
+          </a:stretch>
+        </p:blipFill>
+        <p:spPr>
+          <a:xfrm>
+            <a:off x="1394455" y="4494345"/>
+            <a:ext cx="8659980" cy="1152693"/>
+          </a:xfrm>
+          <a:prstGeom prst="rect">
+            <a:avLst/>
+          </a:prstGeom>
+        </p:spPr>
+      </p:pic>
+      <mc:AlternateContent xmlns:mc="http://schemas.openxmlformats.org/markup-compatibility/2006">
+        <mc:Choice xmlns:a14="http://schemas.microsoft.com/office/drawing/2010/main" Requires="a14">
+          <p:sp>
+            <p:nvSpPr>
+              <p:cNvPr id="12" name="TextBox 11">
+                <a:extLst>
+                  <a:ext uri="{FF2B5EF4-FFF2-40B4-BE49-F238E27FC236}">
+                    <a16:creationId xmlns:a16="http://schemas.microsoft.com/office/drawing/2014/main" id="{0E20A75B-0813-D656-2B9E-FCA95750DB4A}"/>
+                  </a:ext>
+                </a:extLst>
+              </p:cNvPr>
+              <p:cNvSpPr txBox="1"/>
+              <p:nvPr/>
+            </p:nvSpPr>
+            <p:spPr>
+              <a:xfrm>
+                <a:off x="-1560040" y="3920823"/>
+                <a:ext cx="6098058" cy="381515"/>
+              </a:xfrm>
+              <a:prstGeom prst="rect">
+                <a:avLst/>
+              </a:prstGeom>
+              <a:noFill/>
+            </p:spPr>
+            <p:txBody>
+              <a:bodyPr wrap="square">
+                <a:spAutoFit/>
+              </a:bodyPr>
+              <a:lstStyle/>
+              <a:p>
+                <a:pPr/>
+                <a14:m>
+                  <m:oMathPara xmlns:m="http://schemas.openxmlformats.org/officeDocument/2006/math">
+                    <m:oMathParaPr>
+                      <m:jc m:val="centerGroup"/>
+                    </m:oMathParaPr>
+                    <m:oMath xmlns:m="http://schemas.openxmlformats.org/officeDocument/2006/math">
+                      <m:sSub>
+                        <m:sSubPr>
+                          <m:ctrlPr>
+                            <a:rPr lang="en-GB" b="0" i="1" smtClean="0">
+                              <a:latin typeface="Cambria Math" panose="02040503050406030204" pitchFamily="18" charset="0"/>
+                            </a:rPr>
+                          </m:ctrlPr>
+                        </m:sSubPr>
+                        <m:e>
+                          <m:r>
+                            <a:rPr lang="en-GB" b="0" i="1" smtClean="0">
+                              <a:latin typeface="Cambria Math" panose="02040503050406030204" pitchFamily="18" charset="0"/>
+                            </a:rPr>
+                            <m:t>𝜆</m:t>
+                          </m:r>
+                        </m:e>
+                        <m:sub>
+                          <m:r>
+                            <a:rPr lang="en-GB" b="0" i="1" smtClean="0">
+                              <a:latin typeface="Cambria Math" panose="02040503050406030204" pitchFamily="18" charset="0"/>
+                            </a:rPr>
+                            <m:t>1,2</m:t>
+                          </m:r>
+                        </m:sub>
+                      </m:sSub>
+                      <m:r>
+                        <a:rPr lang="en-GB" b="0" i="1" smtClean="0">
+                          <a:latin typeface="Cambria Math" panose="02040503050406030204" pitchFamily="18" charset="0"/>
+                        </a:rPr>
+                        <m:t>=</m:t>
+                      </m:r>
+                      <m:r>
+                        <a:rPr lang="en-GB" b="0" i="1" smtClean="0">
+                          <a:latin typeface="Cambria Math" panose="02040503050406030204" pitchFamily="18" charset="0"/>
+                        </a:rPr>
+                        <m:t>𝜎</m:t>
+                      </m:r>
+                      <m:r>
+                        <a:rPr lang="en-GB" b="0" i="1" smtClean="0">
+                          <a:latin typeface="Cambria Math" panose="02040503050406030204" pitchFamily="18" charset="0"/>
+                          <a:ea typeface="Cambria Math" panose="02040503050406030204" pitchFamily="18" charset="0"/>
+                        </a:rPr>
+                        <m:t>±</m:t>
+                      </m:r>
+                      <m:r>
+                        <a:rPr lang="en-GB" b="0" i="1" smtClean="0">
+                          <a:latin typeface="Cambria Math" panose="02040503050406030204" pitchFamily="18" charset="0"/>
+                          <a:ea typeface="Cambria Math" panose="02040503050406030204" pitchFamily="18" charset="0"/>
+                        </a:rPr>
+                        <m:t>𝑗</m:t>
+                      </m:r>
+                      <m:sSub>
+                        <m:sSubPr>
+                          <m:ctrlPr>
+                            <a:rPr lang="en-GB" b="0" i="1" smtClean="0">
+                              <a:latin typeface="Cambria Math" panose="02040503050406030204" pitchFamily="18" charset="0"/>
+                              <a:ea typeface="Cambria Math" panose="02040503050406030204" pitchFamily="18" charset="0"/>
+                            </a:rPr>
+                          </m:ctrlPr>
+                        </m:sSubPr>
+                        <m:e>
+                          <m:r>
+                            <a:rPr lang="en-GB" b="0" i="1" smtClean="0">
+                              <a:latin typeface="Cambria Math" panose="02040503050406030204" pitchFamily="18" charset="0"/>
+                              <a:ea typeface="Cambria Math" panose="02040503050406030204" pitchFamily="18" charset="0"/>
+                            </a:rPr>
+                            <m:t>𝜔</m:t>
+                          </m:r>
+                        </m:e>
+                        <m:sub>
+                          <m:r>
+                            <a:rPr lang="en-GB" b="0" i="1" smtClean="0">
+                              <a:latin typeface="Cambria Math" panose="02040503050406030204" pitchFamily="18" charset="0"/>
+                              <a:ea typeface="Cambria Math" panose="02040503050406030204" pitchFamily="18" charset="0"/>
+                            </a:rPr>
+                            <m:t>𝑑</m:t>
+                          </m:r>
+                        </m:sub>
+                      </m:sSub>
+                    </m:oMath>
+                  </m:oMathPara>
+                </a14:m>
+                <a:endParaRPr lang="en-GB" dirty="0"/>
+              </a:p>
+            </p:txBody>
+          </p:sp>
+        </mc:Choice>
+        <mc:Fallback>
+          <p:sp>
+            <p:nvSpPr>
+              <p:cNvPr id="12" name="TextBox 11">
+                <a:extLst>
+                  <a:ext uri="{FF2B5EF4-FFF2-40B4-BE49-F238E27FC236}">
+                    <a16:creationId xmlns:a16="http://schemas.microsoft.com/office/drawing/2014/main" id="{0E20A75B-0813-D656-2B9E-FCA95750DB4A}"/>
+                  </a:ext>
+                </a:extLst>
+              </p:cNvPr>
+              <p:cNvSpPr txBox="1">
+                <a:spLocks noRot="1" noChangeAspect="1" noMove="1" noResize="1" noEditPoints="1" noAdjustHandles="1" noChangeArrowheads="1" noChangeShapeType="1" noTextEdit="1"/>
+              </p:cNvSpPr>
+              <p:nvPr/>
+            </p:nvSpPr>
+            <p:spPr>
+              <a:xfrm>
+                <a:off x="-1560040" y="3920823"/>
+                <a:ext cx="6098058" cy="381515"/>
+              </a:xfrm>
+              <a:prstGeom prst="rect">
+                <a:avLst/>
+              </a:prstGeom>
+              <a:blipFill>
+                <a:blip r:embed="rId5"/>
+                <a:stretch>
+                  <a:fillRect b="-9677"/>
+                </a:stretch>
+              </a:blipFill>
+            </p:spPr>
+            <p:txBody>
+              <a:bodyPr/>
+              <a:lstStyle/>
+              <a:p>
+                <a:r>
+                  <a:rPr lang="en-GB">
+                    <a:noFill/>
+                  </a:rPr>
+                  <a:t> </a:t>
+                </a:r>
+              </a:p>
+            </p:txBody>
+          </p:sp>
+        </mc:Fallback>
+      </mc:AlternateContent>
+    </p:spTree>
+    <p:extLst>
+      <p:ext uri="{BB962C8B-B14F-4D97-AF65-F5344CB8AC3E}">
+        <p14:creationId xmlns:p14="http://schemas.microsoft.com/office/powerpoint/2010/main" val="2791964129"/>
+      </p:ext>
+    </p:extLst>
+  </p:cSld>
+  <p:clrMapOvr>
+    <a:masterClrMapping/>
+  </p:clrMapOvr>
+</p:sld>
+</file>
+
+<file path=ppt/slides/slide15.xml><?xml version="1.0" encoding="utf-8"?>
 <p:sld xmlns:a="http://schemas.openxmlformats.org/drawingml/2006/main" xmlns:r="http://schemas.openxmlformats.org/officeDocument/2006/relationships" xmlns:p="http://schemas.openxmlformats.org/presentationml/2006/main">
   <p:cSld>
     <p:spTree>
@@ -7050,7 +7407,7 @@
 </p:sld>
 </file>
 
-<file path=ppt/slides/slide15.xml><?xml version="1.0" encoding="utf-8"?>
+<file path=ppt/slides/slide16.xml><?xml version="1.0" encoding="utf-8"?>
 <p:sld xmlns:a="http://schemas.openxmlformats.org/drawingml/2006/main" xmlns:r="http://schemas.openxmlformats.org/officeDocument/2006/relationships" xmlns:p="http://schemas.openxmlformats.org/presentationml/2006/main">
   <p:cSld>
     <p:spTree>
@@ -7539,7 +7896,7 @@
 </p:sld>
 </file>
 
-<file path=ppt/slides/slide16.xml><?xml version="1.0" encoding="utf-8"?>
+<file path=ppt/slides/slide17.xml><?xml version="1.0" encoding="utf-8"?>
 <p:sld xmlns:a="http://schemas.openxmlformats.org/drawingml/2006/main" xmlns:r="http://schemas.openxmlformats.org/officeDocument/2006/relationships" xmlns:p="http://schemas.openxmlformats.org/presentationml/2006/main">
   <p:cSld>
     <p:spTree>
@@ -7574,18 +7931,20 @@
         </p:nvSpPr>
         <p:spPr/>
         <p:txBody>
-          <a:bodyPr/>
+          <a:bodyPr>
+            <a:normAutofit/>
+          </a:bodyPr>
           <a:lstStyle/>
           <a:p>
             <a:r>
-              <a:rPr lang="en-US" dirty="0"/>
+              <a:rPr lang="en-US" sz="4000" dirty="0"/>
               <a:t>Modal motion in free vibration – Eigenvectors</a:t>
             </a:r>
           </a:p>
         </p:txBody>
       </p:sp>
-      <mc:AlternateContent xmlns:mc="http://schemas.openxmlformats.org/markup-compatibility/2006">
-        <mc:Choice xmlns:a14="http://schemas.microsoft.com/office/drawing/2010/main" Requires="a14">
+      <mc:AlternateContent xmlns:mc="http://schemas.openxmlformats.org/markup-compatibility/2006" xmlns:a14="http://schemas.microsoft.com/office/drawing/2010/main">
+        <mc:Choice Requires="a14">
           <p:sp>
             <p:nvSpPr>
               <p:cNvPr id="3" name="Content Placeholder 2">
@@ -8211,7 +8570,7 @@
             </p:txBody>
           </p:sp>
         </mc:Choice>
-        <mc:Fallback>
+        <mc:Fallback xmlns="">
           <p:sp>
             <p:nvSpPr>
               <p:cNvPr id="3" name="Content Placeholder 2">
@@ -8268,7 +8627,7 @@
 </p:sld>
 </file>
 
-<file path=ppt/slides/slide17.xml><?xml version="1.0" encoding="utf-8"?>
+<file path=ppt/slides/slide18.xml><?xml version="1.0" encoding="utf-8"?>
 <p:sld xmlns:a="http://schemas.openxmlformats.org/drawingml/2006/main" xmlns:r="http://schemas.openxmlformats.org/officeDocument/2006/relationships" xmlns:p="http://schemas.openxmlformats.org/presentationml/2006/main">
   <p:cSld>
     <p:spTree>
@@ -9053,7 +9412,7 @@
 </p:sld>
 </file>
 
-<file path=ppt/slides/slide18.xml><?xml version="1.0" encoding="utf-8"?>
+<file path=ppt/slides/slide19.xml><?xml version="1.0" encoding="utf-8"?>
 <p:sld xmlns:a="http://schemas.openxmlformats.org/drawingml/2006/main" xmlns:r="http://schemas.openxmlformats.org/officeDocument/2006/relationships" xmlns:p="http://schemas.openxmlformats.org/presentationml/2006/main">
   <p:cSld>
     <p:spTree>
@@ -9302,174 +9661,6 @@
 </p:sld>
 </file>
 
-<file path=ppt/slides/slide19.xml><?xml version="1.0" encoding="utf-8"?>
-<p:sld xmlns:a="http://schemas.openxmlformats.org/drawingml/2006/main" xmlns:r="http://schemas.openxmlformats.org/officeDocument/2006/relationships" xmlns:p="http://schemas.openxmlformats.org/presentationml/2006/main">
-  <p:cSld>
-    <p:spTree>
-      <p:nvGrpSpPr>
-        <p:cNvPr id="1" name=""/>
-        <p:cNvGrpSpPr/>
-        <p:nvPr/>
-      </p:nvGrpSpPr>
-      <p:grpSpPr>
-        <a:xfrm>
-          <a:off x="0" y="0"/>
-          <a:ext cx="0" cy="0"/>
-          <a:chOff x="0" y="0"/>
-          <a:chExt cx="0" cy="0"/>
-        </a:xfrm>
-      </p:grpSpPr>
-      <p:sp>
-        <p:nvSpPr>
-          <p:cNvPr id="2" name="Title 1">
-            <a:extLst>
-              <a:ext uri="{FF2B5EF4-FFF2-40B4-BE49-F238E27FC236}">
-                <a16:creationId xmlns:a16="http://schemas.microsoft.com/office/drawing/2014/main" id="{4DC0A211-2321-334B-810E-847909D96308}"/>
-              </a:ext>
-            </a:extLst>
-          </p:cNvPr>
-          <p:cNvSpPr>
-            <a:spLocks noGrp="1"/>
-          </p:cNvSpPr>
-          <p:nvPr>
-            <p:ph type="title"/>
-          </p:nvPr>
-        </p:nvSpPr>
-        <p:spPr/>
-        <p:txBody>
-          <a:bodyPr/>
-          <a:lstStyle/>
-          <a:p>
-            <a:r>
-              <a:rPr lang="en-US" dirty="0"/>
-              <a:t>Modal motion in free vibration – Eigenvectors</a:t>
-            </a:r>
-          </a:p>
-        </p:txBody>
-      </p:sp>
-      <p:sp>
-        <p:nvSpPr>
-          <p:cNvPr id="3" name="Content Placeholder 2">
-            <a:extLst>
-              <a:ext uri="{FF2B5EF4-FFF2-40B4-BE49-F238E27FC236}">
-                <a16:creationId xmlns:a16="http://schemas.microsoft.com/office/drawing/2014/main" id="{F7A93CC8-8D10-014F-BE13-3B512B5BB008}"/>
-              </a:ext>
-            </a:extLst>
-          </p:cNvPr>
-          <p:cNvSpPr>
-            <a:spLocks noGrp="1"/>
-          </p:cNvSpPr>
-          <p:nvPr>
-            <p:ph idx="1"/>
-          </p:nvPr>
-        </p:nvSpPr>
-        <p:spPr>
-          <a:xfrm>
-            <a:off x="838200" y="1825625"/>
-            <a:ext cx="3854824" cy="4351338"/>
-          </a:xfrm>
-        </p:spPr>
-        <p:txBody>
-          <a:bodyPr/>
-          <a:lstStyle/>
-          <a:p>
-            <a:r>
-              <a:rPr lang="en-US" dirty="0"/>
-              <a:t>Similarly for the second (non-conjugate) mode of interest</a:t>
-            </a:r>
-          </a:p>
-          <a:p>
-            <a:r>
-              <a:rPr lang="en-US" dirty="0"/>
-              <a:t>The relative magnitude and phase is seen on the two plots</a:t>
-            </a:r>
-          </a:p>
-          <a:p>
-            <a:r>
-              <a:rPr lang="en-US" dirty="0"/>
-              <a:t>Note the differences between first and second modes of vibration</a:t>
-            </a:r>
-          </a:p>
-        </p:txBody>
-      </p:sp>
-      <p:pic>
-        <p:nvPicPr>
-          <p:cNvPr id="4" name="Picture 3">
-            <a:extLst>
-              <a:ext uri="{FF2B5EF4-FFF2-40B4-BE49-F238E27FC236}">
-                <a16:creationId xmlns:a16="http://schemas.microsoft.com/office/drawing/2014/main" id="{5ED856DF-0FD6-CC4F-8FDE-C269987B55C2}"/>
-              </a:ext>
-            </a:extLst>
-          </p:cNvPr>
-          <p:cNvPicPr>
-            <a:picLocks noChangeAspect="1"/>
-          </p:cNvPicPr>
-          <p:nvPr/>
-        </p:nvPicPr>
-        <p:blipFill>
-          <a:blip r:embed="rId2"/>
-          <a:stretch>
-            <a:fillRect/>
-          </a:stretch>
-        </p:blipFill>
-        <p:spPr>
-          <a:xfrm>
-            <a:off x="6351494" y="1530344"/>
-            <a:ext cx="3440593" cy="4351339"/>
-          </a:xfrm>
-          <a:prstGeom prst="rect">
-            <a:avLst/>
-          </a:prstGeom>
-        </p:spPr>
-      </p:pic>
-      <p:sp>
-        <p:nvSpPr>
-          <p:cNvPr id="5" name="TextBox 4">
-            <a:extLst>
-              <a:ext uri="{FF2B5EF4-FFF2-40B4-BE49-F238E27FC236}">
-                <a16:creationId xmlns:a16="http://schemas.microsoft.com/office/drawing/2014/main" id="{7EA2F75F-7778-6945-9567-35C217AFF8BB}"/>
-              </a:ext>
-            </a:extLst>
-          </p:cNvPr>
-          <p:cNvSpPr txBox="1"/>
-          <p:nvPr/>
-        </p:nvSpPr>
-        <p:spPr>
-          <a:xfrm>
-            <a:off x="10580914" y="1825625"/>
-            <a:ext cx="910827" cy="369332"/>
-          </a:xfrm>
-          <a:prstGeom prst="rect">
-            <a:avLst/>
-          </a:prstGeom>
-          <a:noFill/>
-        </p:spPr>
-        <p:txBody>
-          <a:bodyPr wrap="none" rtlCol="0">
-            <a:spAutoFit/>
-          </a:bodyPr>
-          <a:lstStyle/>
-          <a:p>
-            <a:r>
-              <a:rPr lang="en-GB" dirty="0"/>
-              <a:t>Mode 2</a:t>
-            </a:r>
-          </a:p>
-        </p:txBody>
-      </p:sp>
-    </p:spTree>
-    <p:extLst>
-      <p:ext uri="{BB962C8B-B14F-4D97-AF65-F5344CB8AC3E}">
-        <p14:creationId xmlns:p14="http://schemas.microsoft.com/office/powerpoint/2010/main" val="1872832693"/>
-      </p:ext>
-    </p:extLst>
-  </p:cSld>
-  <p:clrMapOvr>
-    <a:masterClrMapping/>
-  </p:clrMapOvr>
-</p:sld>
-</file>
-
 <file path=ppt/slides/slide2.xml><?xml version="1.0" encoding="utf-8"?>
 <p:sld xmlns:a="http://schemas.openxmlformats.org/drawingml/2006/main" xmlns:r="http://schemas.openxmlformats.org/officeDocument/2006/relationships" xmlns:p="http://schemas.openxmlformats.org/presentationml/2006/main">
   <p:cSld>
@@ -9682,6 +9873,174 @@
 </file>
 
 <file path=ppt/slides/slide20.xml><?xml version="1.0" encoding="utf-8"?>
+<p:sld xmlns:a="http://schemas.openxmlformats.org/drawingml/2006/main" xmlns:r="http://schemas.openxmlformats.org/officeDocument/2006/relationships" xmlns:p="http://schemas.openxmlformats.org/presentationml/2006/main">
+  <p:cSld>
+    <p:spTree>
+      <p:nvGrpSpPr>
+        <p:cNvPr id="1" name=""/>
+        <p:cNvGrpSpPr/>
+        <p:nvPr/>
+      </p:nvGrpSpPr>
+      <p:grpSpPr>
+        <a:xfrm>
+          <a:off x="0" y="0"/>
+          <a:ext cx="0" cy="0"/>
+          <a:chOff x="0" y="0"/>
+          <a:chExt cx="0" cy="0"/>
+        </a:xfrm>
+      </p:grpSpPr>
+      <p:sp>
+        <p:nvSpPr>
+          <p:cNvPr id="2" name="Title 1">
+            <a:extLst>
+              <a:ext uri="{FF2B5EF4-FFF2-40B4-BE49-F238E27FC236}">
+                <a16:creationId xmlns:a16="http://schemas.microsoft.com/office/drawing/2014/main" id="{4DC0A211-2321-334B-810E-847909D96308}"/>
+              </a:ext>
+            </a:extLst>
+          </p:cNvPr>
+          <p:cNvSpPr>
+            <a:spLocks noGrp="1"/>
+          </p:cNvSpPr>
+          <p:nvPr>
+            <p:ph type="title"/>
+          </p:nvPr>
+        </p:nvSpPr>
+        <p:spPr/>
+        <p:txBody>
+          <a:bodyPr/>
+          <a:lstStyle/>
+          <a:p>
+            <a:r>
+              <a:rPr lang="en-US" dirty="0"/>
+              <a:t>Modal motion in free vibration – Eigenvectors</a:t>
+            </a:r>
+          </a:p>
+        </p:txBody>
+      </p:sp>
+      <p:sp>
+        <p:nvSpPr>
+          <p:cNvPr id="3" name="Content Placeholder 2">
+            <a:extLst>
+              <a:ext uri="{FF2B5EF4-FFF2-40B4-BE49-F238E27FC236}">
+                <a16:creationId xmlns:a16="http://schemas.microsoft.com/office/drawing/2014/main" id="{F7A93CC8-8D10-014F-BE13-3B512B5BB008}"/>
+              </a:ext>
+            </a:extLst>
+          </p:cNvPr>
+          <p:cNvSpPr>
+            <a:spLocks noGrp="1"/>
+          </p:cNvSpPr>
+          <p:nvPr>
+            <p:ph idx="1"/>
+          </p:nvPr>
+        </p:nvSpPr>
+        <p:spPr>
+          <a:xfrm>
+            <a:off x="838200" y="1825625"/>
+            <a:ext cx="3854824" cy="4351338"/>
+          </a:xfrm>
+        </p:spPr>
+        <p:txBody>
+          <a:bodyPr/>
+          <a:lstStyle/>
+          <a:p>
+            <a:r>
+              <a:rPr lang="en-US" dirty="0"/>
+              <a:t>Similarly for the second (non-conjugate) mode of interest</a:t>
+            </a:r>
+          </a:p>
+          <a:p>
+            <a:r>
+              <a:rPr lang="en-US" dirty="0"/>
+              <a:t>The relative magnitude and phase is seen on the two plots</a:t>
+            </a:r>
+          </a:p>
+          <a:p>
+            <a:r>
+              <a:rPr lang="en-US" dirty="0"/>
+              <a:t>Note the differences between first and second modes of vibration</a:t>
+            </a:r>
+          </a:p>
+        </p:txBody>
+      </p:sp>
+      <p:pic>
+        <p:nvPicPr>
+          <p:cNvPr id="4" name="Picture 3">
+            <a:extLst>
+              <a:ext uri="{FF2B5EF4-FFF2-40B4-BE49-F238E27FC236}">
+                <a16:creationId xmlns:a16="http://schemas.microsoft.com/office/drawing/2014/main" id="{5ED856DF-0FD6-CC4F-8FDE-C269987B55C2}"/>
+              </a:ext>
+            </a:extLst>
+          </p:cNvPr>
+          <p:cNvPicPr>
+            <a:picLocks noChangeAspect="1"/>
+          </p:cNvPicPr>
+          <p:nvPr/>
+        </p:nvPicPr>
+        <p:blipFill>
+          <a:blip r:embed="rId2"/>
+          <a:stretch>
+            <a:fillRect/>
+          </a:stretch>
+        </p:blipFill>
+        <p:spPr>
+          <a:xfrm>
+            <a:off x="6351494" y="1530344"/>
+            <a:ext cx="3440593" cy="4351339"/>
+          </a:xfrm>
+          <a:prstGeom prst="rect">
+            <a:avLst/>
+          </a:prstGeom>
+        </p:spPr>
+      </p:pic>
+      <p:sp>
+        <p:nvSpPr>
+          <p:cNvPr id="5" name="TextBox 4">
+            <a:extLst>
+              <a:ext uri="{FF2B5EF4-FFF2-40B4-BE49-F238E27FC236}">
+                <a16:creationId xmlns:a16="http://schemas.microsoft.com/office/drawing/2014/main" id="{7EA2F75F-7778-6945-9567-35C217AFF8BB}"/>
+              </a:ext>
+            </a:extLst>
+          </p:cNvPr>
+          <p:cNvSpPr txBox="1"/>
+          <p:nvPr/>
+        </p:nvSpPr>
+        <p:spPr>
+          <a:xfrm>
+            <a:off x="10580914" y="1825625"/>
+            <a:ext cx="910827" cy="369332"/>
+          </a:xfrm>
+          <a:prstGeom prst="rect">
+            <a:avLst/>
+          </a:prstGeom>
+          <a:noFill/>
+        </p:spPr>
+        <p:txBody>
+          <a:bodyPr wrap="none" rtlCol="0">
+            <a:spAutoFit/>
+          </a:bodyPr>
+          <a:lstStyle/>
+          <a:p>
+            <a:r>
+              <a:rPr lang="en-GB" dirty="0"/>
+              <a:t>Mode 2</a:t>
+            </a:r>
+          </a:p>
+        </p:txBody>
+      </p:sp>
+    </p:spTree>
+    <p:extLst>
+      <p:ext uri="{BB962C8B-B14F-4D97-AF65-F5344CB8AC3E}">
+        <p14:creationId xmlns:p14="http://schemas.microsoft.com/office/powerpoint/2010/main" val="1872832693"/>
+      </p:ext>
+    </p:extLst>
+  </p:cSld>
+  <p:clrMapOvr>
+    <a:masterClrMapping/>
+  </p:clrMapOvr>
+</p:sld>
+</file>
+
+<file path=ppt/slides/slide21.xml><?xml version="1.0" encoding="utf-8"?>
 <p:sld xmlns:a="http://schemas.openxmlformats.org/drawingml/2006/main" xmlns:r="http://schemas.openxmlformats.org/officeDocument/2006/relationships" xmlns:p="http://schemas.openxmlformats.org/presentationml/2006/main">
   <p:cSld>
     <p:spTree>
@@ -10321,8 +10680,8 @@
         </p:blipFill>
         <p:spPr>
           <a:xfrm>
-            <a:off x="7085716" y="3021162"/>
-            <a:ext cx="4506509" cy="2556366"/>
+            <a:off x="6804212" y="3145404"/>
+            <a:ext cx="4906544" cy="2783290"/>
           </a:xfrm>
           <a:prstGeom prst="rect">
             <a:avLst/>
@@ -10503,7 +10862,11 @@
               <a:p>
                 <a:r>
                   <a:rPr lang="en-US" dirty="0"/>
-                  <a:t>The nature of the roots e.g. complex, repeated, distinct and real determine the general solution approach.</a:t>
+                  <a:t>The nature of the roots e.g. complex, repeated, distinct and real determine the general solution approach. </a:t>
+                </a:r>
+                <a:r>
+                  <a:rPr lang="en-US" u="sng" dirty="0"/>
+                  <a:t>They also define the dynamics of the system.</a:t>
                 </a:r>
               </a:p>
               <a:p>
@@ -10543,7 +10906,7 @@
               <a:blipFill>
                 <a:blip r:embed="rId2"/>
                 <a:stretch>
-                  <a:fillRect l="-1314" t="-3235" r="-821"/>
+                  <a:fillRect l="-1314" t="-3235" r="-821" b="-2426"/>
                 </a:stretch>
               </a:blipFill>
             </p:spPr>
@@ -10887,8 +11250,8 @@
           </a:p>
         </p:txBody>
       </p:sp>
-      <mc:AlternateContent xmlns:mc="http://schemas.openxmlformats.org/markup-compatibility/2006">
-        <mc:Choice xmlns:a14="http://schemas.microsoft.com/office/drawing/2010/main" Requires="a14">
+      <mc:AlternateContent xmlns:mc="http://schemas.openxmlformats.org/markup-compatibility/2006" xmlns:a14="http://schemas.microsoft.com/office/drawing/2010/main">
+        <mc:Choice Requires="a14">
           <p:sp>
             <p:nvSpPr>
               <p:cNvPr id="5" name="Content Placeholder 4">
@@ -11520,7 +11883,7 @@
             </p:txBody>
           </p:sp>
         </mc:Choice>
-        <mc:Fallback>
+        <mc:Fallback xmlns="">
           <p:sp>
             <p:nvSpPr>
               <p:cNvPr id="5" name="Content Placeholder 4">
@@ -11842,7 +12205,27 @@
               <a:p>
                 <a:r>
                   <a:rPr lang="en-GB" dirty="0"/>
-                  <a:t>It can be shown that the transfer function poles are the roots of the Characteristic Equation and the eigenvalues of A</a:t>
+                  <a:t>It can be shown that the </a:t>
+                </a:r>
+                <a:r>
+                  <a:rPr lang="en-GB" u="sng" dirty="0"/>
+                  <a:t>transfer function poles </a:t>
+                </a:r>
+                <a:r>
+                  <a:rPr lang="en-GB" dirty="0"/>
+                  <a:t>are the </a:t>
+                </a:r>
+                <a:r>
+                  <a:rPr lang="en-GB" u="sng" dirty="0"/>
+                  <a:t>roots of the Characteristic Equation</a:t>
+                </a:r>
+                <a:r>
+                  <a:rPr lang="en-GB" dirty="0"/>
+                  <a:t> and the </a:t>
+                </a:r>
+                <a:r>
+                  <a:rPr lang="en-GB" u="sng" dirty="0"/>
+                  <a:t>eigenvalues of A</a:t>
                 </a:r>
               </a:p>
               <a:p>
@@ -12248,6 +12631,65 @@
           </p:txBody>
         </p:sp>
       </p:grpSp>
+      <p:sp>
+        <p:nvSpPr>
+          <p:cNvPr id="11" name="Rounded Rectangle 10">
+            <a:extLst>
+              <a:ext uri="{FF2B5EF4-FFF2-40B4-BE49-F238E27FC236}">
+                <a16:creationId xmlns:a16="http://schemas.microsoft.com/office/drawing/2014/main" id="{5A9647BB-2809-F9CB-6244-9F0942C29BDC}"/>
+              </a:ext>
+            </a:extLst>
+          </p:cNvPr>
+          <p:cNvSpPr/>
+          <p:nvPr/>
+        </p:nvSpPr>
+        <p:spPr>
+          <a:xfrm>
+            <a:off x="2627086" y="2177143"/>
+            <a:ext cx="7315200" cy="3120571"/>
+          </a:xfrm>
+          <a:prstGeom prst="roundRect">
+            <a:avLst>
+              <a:gd name="adj" fmla="val 6434"/>
+            </a:avLst>
+          </a:prstGeom>
+          <a:solidFill>
+            <a:schemeClr val="bg1"/>
+          </a:solidFill>
+          <a:ln w="25400"/>
+        </p:spPr>
+        <p:style>
+          <a:lnRef idx="2">
+            <a:schemeClr val="accent1">
+              <a:shade val="15000"/>
+            </a:schemeClr>
+          </a:lnRef>
+          <a:fillRef idx="1">
+            <a:schemeClr val="accent1"/>
+          </a:fillRef>
+          <a:effectRef idx="0">
+            <a:schemeClr val="accent1"/>
+          </a:effectRef>
+          <a:fontRef idx="minor">
+            <a:schemeClr val="lt1"/>
+          </a:fontRef>
+        </p:style>
+        <p:txBody>
+          <a:bodyPr rtlCol="0" anchor="ctr"/>
+          <a:lstStyle/>
+          <a:p>
+            <a:pPr algn="ctr"/>
+            <a:r>
+              <a:rPr lang="en-GB" sz="2800" dirty="0">
+                <a:solidFill>
+                  <a:schemeClr val="tx1"/>
+                </a:solidFill>
+              </a:rPr>
+              <a:t>The eigenvalues therefore tell us about the damping and natural frequency of each mode of the system </a:t>
+            </a:r>
+          </a:p>
+        </p:txBody>
+      </p:sp>
     </p:spTree>
     <p:extLst>
       <p:ext uri="{BB962C8B-B14F-4D97-AF65-F5344CB8AC3E}">
@@ -12311,6 +12753,51 @@
                       </p:childTnLst>
                     </p:cTn>
                   </p:par>
+                  <p:par>
+                    <p:cTn id="7" fill="hold">
+                      <p:stCondLst>
+                        <p:cond delay="indefinite"/>
+                      </p:stCondLst>
+                      <p:childTnLst>
+                        <p:par>
+                          <p:cTn id="8" fill="hold">
+                            <p:stCondLst>
+                              <p:cond delay="0"/>
+                            </p:stCondLst>
+                            <p:childTnLst>
+                              <p:par>
+                                <p:cTn id="9" presetID="1" presetClass="entr" presetSubtype="0" fill="hold" grpId="0" nodeType="clickEffect">
+                                  <p:stCondLst>
+                                    <p:cond delay="0"/>
+                                  </p:stCondLst>
+                                  <p:childTnLst>
+                                    <p:set>
+                                      <p:cBhvr>
+                                        <p:cTn id="10" dur="1" fill="hold">
+                                          <p:stCondLst>
+                                            <p:cond delay="0"/>
+                                          </p:stCondLst>
+                                        </p:cTn>
+                                        <p:tgtEl>
+                                          <p:spTgt spid="11"/>
+                                        </p:tgtEl>
+                                        <p:attrNameLst>
+                                          <p:attrName>style.visibility</p:attrName>
+                                        </p:attrNameLst>
+                                      </p:cBhvr>
+                                      <p:to>
+                                        <p:strVal val="visible"/>
+                                      </p:to>
+                                    </p:set>
+                                  </p:childTnLst>
+                                </p:cTn>
+                              </p:par>
+                            </p:childTnLst>
+                          </p:cTn>
+                        </p:par>
+                      </p:childTnLst>
+                    </p:cTn>
+                  </p:par>
                 </p:childTnLst>
               </p:cTn>
               <p:prevCondLst>
@@ -12332,6 +12819,9 @@
         </p:cTn>
       </p:par>
     </p:tnLst>
+    <p:bldLst>
+      <p:bldP spid="11" grpId="0" animBg="1"/>
+    </p:bldLst>
   </p:timing>
 </p:sld>
 </file>
@@ -12480,8 +12970,8 @@
           </a:prstGeom>
         </p:spPr>
       </p:pic>
-      <mc:AlternateContent xmlns:mc="http://schemas.openxmlformats.org/markup-compatibility/2006">
-        <mc:Choice xmlns:a14="http://schemas.microsoft.com/office/drawing/2010/main" Requires="a14">
+      <mc:AlternateContent xmlns:mc="http://schemas.openxmlformats.org/markup-compatibility/2006" xmlns:a14="http://schemas.microsoft.com/office/drawing/2010/main">
+        <mc:Choice Requires="a14">
           <p:sp>
             <p:nvSpPr>
               <p:cNvPr id="3" name="TextBox 2">
@@ -13135,7 +13625,7 @@
             </p:txBody>
           </p:sp>
         </mc:Choice>
-        <mc:Fallback>
+        <mc:Fallback xmlns="">
           <p:sp>
             <p:nvSpPr>
               <p:cNvPr id="3" name="TextBox 2">
@@ -13324,7 +13814,7 @@
         </p:nvSpPr>
         <p:spPr>
           <a:xfrm>
-            <a:off x="1463281" y="359764"/>
+            <a:off x="1149725" y="349895"/>
             <a:ext cx="5526000" cy="923330"/>
           </a:xfrm>
           <a:prstGeom prst="rect">

</xml_diff>